<commit_message>
Updated pp with new exercises, updated readme and hints with new exercises
</commit_message>
<xml_diff>
--- a/neo4j/neo4j_johannesDolk.pptx
+++ b/neo4j/neo4j_johannesDolk.pptx
@@ -5,7 +5,7 @@
     <p:sldMasterId id="2147483648" r:id="rId1"/>
   </p:sldMasterIdLst>
   <p:notesMasterIdLst>
-    <p:notesMasterId r:id="rId50"/>
+    <p:notesMasterId r:id="rId49"/>
   </p:notesMasterIdLst>
   <p:sldIdLst>
     <p:sldId id="256" r:id="rId2"/>
@@ -53,9 +53,8 @@
     <p:sldId id="322" r:id="rId44"/>
     <p:sldId id="310" r:id="rId45"/>
     <p:sldId id="280" r:id="rId46"/>
-    <p:sldId id="281" r:id="rId47"/>
-    <p:sldId id="327" r:id="rId48"/>
-    <p:sldId id="323" r:id="rId49"/>
+    <p:sldId id="327" r:id="rId47"/>
+    <p:sldId id="323" r:id="rId48"/>
   </p:sldIdLst>
   <p:sldSz cx="12192000" cy="6858000"/>
   <p:notesSz cx="6858000" cy="9144000"/>
@@ -31564,7 +31563,7 @@
           <a:p>
             <a:fld id="{C187DC66-C777-0448-978B-869498E0F458}" type="datetimeFigureOut">
               <a:rPr lang="en-US" smtClean="0"/>
-              <a:t>12/11/16</a:t>
+              <a:t>12/13/16</a:t>
             </a:fld>
             <a:endParaRPr lang="en-US"/>
           </a:p>
@@ -33409,7 +33408,7 @@
           <a:p>
             <a:fld id="{A9D7FFA4-BB52-EA43-B2D5-AD606D0D4AFB}" type="slidenum">
               <a:rPr lang="en-US" smtClean="0"/>
-              <a:t>48</a:t>
+              <a:t>47</a:t>
             </a:fld>
             <a:endParaRPr lang="en-US"/>
           </a:p>
@@ -34187,7 +34186,7 @@
           <a:p>
             <a:fld id="{48A87A34-81AB-432B-8DAE-1953F412C126}" type="datetimeFigureOut">
               <a:rPr lang="en-US" dirty="0"/>
-              <a:t>12/11/16</a:t>
+              <a:t>12/13/16</a:t>
             </a:fld>
             <a:endParaRPr lang="en-US" dirty="0"/>
           </a:p>
@@ -34494,7 +34493,7 @@
           <a:p>
             <a:fld id="{48A87A34-81AB-432B-8DAE-1953F412C126}" type="datetimeFigureOut">
               <a:rPr lang="en-US" dirty="0"/>
-              <a:t>12/11/16</a:t>
+              <a:t>12/13/16</a:t>
             </a:fld>
             <a:endParaRPr lang="en-US" dirty="0"/>
           </a:p>
@@ -34711,7 +34710,7 @@
           <a:p>
             <a:fld id="{48A87A34-81AB-432B-8DAE-1953F412C126}" type="datetimeFigureOut">
               <a:rPr lang="en-US" dirty="0"/>
-              <a:t>12/11/16</a:t>
+              <a:t>12/13/16</a:t>
             </a:fld>
             <a:endParaRPr lang="en-US" dirty="0"/>
           </a:p>
@@ -34997,7 +34996,7 @@
           <a:p>
             <a:fld id="{48A87A34-81AB-432B-8DAE-1953F412C126}" type="datetimeFigureOut">
               <a:rPr lang="en-US" dirty="0"/>
-              <a:t>12/11/16</a:t>
+              <a:t>12/13/16</a:t>
             </a:fld>
             <a:endParaRPr lang="en-US" dirty="0"/>
           </a:p>
@@ -35446,7 +35445,7 @@
           <a:p>
             <a:fld id="{48A87A34-81AB-432B-8DAE-1953F412C126}" type="datetimeFigureOut">
               <a:rPr lang="en-US" dirty="0"/>
-              <a:t>12/11/16</a:t>
+              <a:t>12/13/16</a:t>
             </a:fld>
             <a:endParaRPr lang="en-US" dirty="0"/>
           </a:p>
@@ -36017,7 +36016,7 @@
           <a:p>
             <a:fld id="{48A87A34-81AB-432B-8DAE-1953F412C126}" type="datetimeFigureOut">
               <a:rPr lang="en-US" dirty="0"/>
-              <a:t>12/11/16</a:t>
+              <a:t>12/13/16</a:t>
             </a:fld>
             <a:endParaRPr lang="en-US" dirty="0"/>
           </a:p>
@@ -36864,7 +36863,7 @@
           <a:p>
             <a:fld id="{48A87A34-81AB-432B-8DAE-1953F412C126}" type="datetimeFigureOut">
               <a:rPr lang="en-US" dirty="0"/>
-              <a:t>12/11/16</a:t>
+              <a:t>12/13/16</a:t>
             </a:fld>
             <a:endParaRPr lang="en-US" dirty="0"/>
           </a:p>
@@ -37064,7 +37063,7 @@
           <a:p>
             <a:fld id="{48A87A34-81AB-432B-8DAE-1953F412C126}" type="datetimeFigureOut">
               <a:rPr lang="en-US" dirty="0"/>
-              <a:t>12/11/16</a:t>
+              <a:t>12/13/16</a:t>
             </a:fld>
             <a:endParaRPr lang="en-US" dirty="0"/>
           </a:p>
@@ -37273,7 +37272,7 @@
           <a:p>
             <a:fld id="{48A87A34-81AB-432B-8DAE-1953F412C126}" type="datetimeFigureOut">
               <a:rPr lang="en-US" dirty="0"/>
-              <a:t>12/11/16</a:t>
+              <a:t>12/13/16</a:t>
             </a:fld>
             <a:endParaRPr lang="en-US" dirty="0"/>
           </a:p>
@@ -37473,7 +37472,7 @@
           <a:p>
             <a:fld id="{48A87A34-81AB-432B-8DAE-1953F412C126}" type="datetimeFigureOut">
               <a:rPr lang="en-US" dirty="0"/>
-              <a:t>12/11/16</a:t>
+              <a:t>12/13/16</a:t>
             </a:fld>
             <a:endParaRPr lang="en-US" dirty="0"/>
           </a:p>
@@ -37748,7 +37747,7 @@
           <a:p>
             <a:fld id="{48A87A34-81AB-432B-8DAE-1953F412C126}" type="datetimeFigureOut">
               <a:rPr lang="en-US" dirty="0"/>
-              <a:t>12/11/16</a:t>
+              <a:t>12/13/16</a:t>
             </a:fld>
             <a:endParaRPr lang="en-US" dirty="0"/>
           </a:p>
@@ -38010,7 +38009,7 @@
           <a:p>
             <a:fld id="{48A87A34-81AB-432B-8DAE-1953F412C126}" type="datetimeFigureOut">
               <a:rPr lang="en-US" dirty="0"/>
-              <a:t>12/11/16</a:t>
+              <a:t>12/13/16</a:t>
             </a:fld>
             <a:endParaRPr lang="en-US" dirty="0"/>
           </a:p>
@@ -38420,7 +38419,7 @@
           <a:p>
             <a:fld id="{48A87A34-81AB-432B-8DAE-1953F412C126}" type="datetimeFigureOut">
               <a:rPr lang="en-US" dirty="0"/>
-              <a:t>12/11/16</a:t>
+              <a:t>12/13/16</a:t>
             </a:fld>
             <a:endParaRPr lang="en-US" dirty="0"/>
           </a:p>
@@ -38563,7 +38562,7 @@
           <a:p>
             <a:fld id="{48A87A34-81AB-432B-8DAE-1953F412C126}" type="datetimeFigureOut">
               <a:rPr lang="en-US" dirty="0"/>
-              <a:t>12/11/16</a:t>
+              <a:t>12/13/16</a:t>
             </a:fld>
             <a:endParaRPr lang="en-US" dirty="0"/>
           </a:p>
@@ -38683,7 +38682,7 @@
           <a:p>
             <a:fld id="{48A87A34-81AB-432B-8DAE-1953F412C126}" type="datetimeFigureOut">
               <a:rPr lang="en-US" dirty="0"/>
-              <a:t>12/11/16</a:t>
+              <a:t>12/13/16</a:t>
             </a:fld>
             <a:endParaRPr lang="en-US" dirty="0"/>
           </a:p>
@@ -38957,7 +38956,7 @@
           <a:p>
             <a:fld id="{48A87A34-81AB-432B-8DAE-1953F412C126}" type="datetimeFigureOut">
               <a:rPr lang="en-US" dirty="0"/>
-              <a:t>12/11/16</a:t>
+              <a:t>12/13/16</a:t>
             </a:fld>
             <a:endParaRPr lang="en-US" dirty="0"/>
           </a:p>
@@ -39264,7 +39263,7 @@
           <a:p>
             <a:fld id="{48A87A34-81AB-432B-8DAE-1953F412C126}" type="datetimeFigureOut">
               <a:rPr lang="en-US" dirty="0"/>
-              <a:t>12/11/16</a:t>
+              <a:t>12/13/16</a:t>
             </a:fld>
             <a:endParaRPr lang="en-US" dirty="0"/>
           </a:p>
@@ -39513,7 +39512,7 @@
             <a:fld id="{48A87A34-81AB-432B-8DAE-1953F412C126}" type="datetimeFigureOut">
               <a:rPr lang="en-US" dirty="0"/>
               <a:pPr/>
-              <a:t>12/11/16</a:t>
+              <a:t>12/13/16</a:t>
             </a:fld>
             <a:endParaRPr lang="en-US" dirty="0"/>
           </a:p>
@@ -41195,13 +41194,13 @@
   <p:clrMapOvr>
     <a:masterClrMapping/>
   </p:clrMapOvr>
-  <mc:AlternateContent xmlns:mc="http://schemas.openxmlformats.org/markup-compatibility/2006">
-    <mc:Choice xmlns:p14="http://schemas.microsoft.com/office/powerpoint/2010/main" Requires="p14">
+  <mc:AlternateContent xmlns:mc="http://schemas.openxmlformats.org/markup-compatibility/2006" xmlns:p14="http://schemas.microsoft.com/office/powerpoint/2010/main">
+    <mc:Choice Requires="p14">
       <p:transition spd="slow">
         <p14:flash/>
       </p:transition>
     </mc:Choice>
-    <mc:Fallback>
+    <mc:Fallback xmlns="">
       <p:transition spd="slow">
         <p:fade/>
       </p:transition>
@@ -42628,18 +42627,12 @@
               <a:rPr lang="en-US" dirty="0" smtClean="0"/>
               <a:t>Graph databases, cypher and neo4j</a:t>
             </a:r>
-            <a:endParaRPr lang="en-US" dirty="0" smtClean="0"/>
           </a:p>
           <a:p>
             <a:r>
               <a:rPr lang="en-US" dirty="0" smtClean="0"/>
-              <a:t>Mutual code </a:t>
+              <a:t>Mutual code exercises</a:t>
             </a:r>
-            <a:r>
-              <a:rPr lang="en-US" dirty="0" smtClean="0"/>
-              <a:t>exercises</a:t>
-            </a:r>
-            <a:endParaRPr lang="en-US" dirty="0" smtClean="0"/>
           </a:p>
           <a:p>
             <a:r>
@@ -42650,13 +42643,8 @@
           <a:p>
             <a:r>
               <a:rPr lang="en-US" dirty="0" smtClean="0"/>
-              <a:t>Mutual </a:t>
+              <a:t>Mutual code exercises </a:t>
             </a:r>
-            <a:r>
-              <a:rPr lang="en-US" dirty="0" smtClean="0"/>
-              <a:t>code exercises </a:t>
-            </a:r>
-            <a:endParaRPr lang="en-US" dirty="0" smtClean="0"/>
           </a:p>
           <a:p>
             <a:r>
@@ -42665,22 +42653,13 @@
             </a:r>
             <a:r>
               <a:rPr lang="en-US" dirty="0" smtClean="0"/>
-              <a:t>work</a:t>
+              <a:t>work </a:t>
             </a:r>
-            <a:r>
-              <a:rPr lang="en-US" dirty="0" smtClean="0"/>
-              <a:t> </a:t>
-            </a:r>
-            <a:endParaRPr lang="en-US" dirty="0" smtClean="0"/>
           </a:p>
           <a:p>
             <a:r>
               <a:rPr lang="en-US" dirty="0" smtClean="0"/>
-              <a:t>Node + </a:t>
-            </a:r>
-            <a:r>
-              <a:rPr lang="en-US" dirty="0" smtClean="0"/>
-              <a:t>NEO4j</a:t>
+              <a:t>Node + NEO4j</a:t>
             </a:r>
             <a:endParaRPr lang="en-US" dirty="0"/>
           </a:p>
@@ -42995,11 +42974,7 @@
           <a:p>
             <a:r>
               <a:rPr lang="en-US" dirty="0" smtClean="0"/>
-              <a:t>Made </a:t>
-            </a:r>
-            <a:r>
-              <a:rPr lang="en-US" dirty="0" smtClean="0"/>
-              <a:t>in </a:t>
+              <a:t>Made in </a:t>
             </a:r>
             <a:r>
               <a:rPr lang="en-US" dirty="0" err="1" smtClean="0"/>
@@ -43022,13 +42997,8 @@
           <a:p>
             <a:r>
               <a:rPr lang="en-US" dirty="0" smtClean="0"/>
-              <a:t>Free community </a:t>
+              <a:t>Free community version</a:t>
             </a:r>
-            <a:r>
-              <a:rPr lang="en-US" dirty="0" smtClean="0"/>
-              <a:t>version</a:t>
-            </a:r>
-            <a:endParaRPr lang="en-US" dirty="0" smtClean="0"/>
           </a:p>
         </p:txBody>
       </p:sp>
@@ -43484,14 +43454,12 @@
               <a:rPr lang="en-US" dirty="0" smtClean="0"/>
               <a:t>REST based communication between client and server</a:t>
             </a:r>
-            <a:endParaRPr lang="en-US" dirty="0" smtClean="0"/>
           </a:p>
           <a:p>
             <a:r>
               <a:rPr lang="en-US" dirty="0" smtClean="0"/>
               <a:t>Spring data supported</a:t>
             </a:r>
-            <a:endParaRPr lang="en-US" dirty="0" smtClean="0"/>
           </a:p>
           <a:p>
             <a:r>
@@ -50539,167 +50507,87 @@
         </p:nvSpPr>
         <p:spPr/>
         <p:txBody>
-          <a:bodyPr/>
+          <a:bodyPr>
+            <a:normAutofit fontScale="92500" lnSpcReduction="20000"/>
+          </a:bodyPr>
           <a:lstStyle/>
           <a:p>
+            <a:pPr lvl="1"/>
             <a:r>
               <a:rPr lang="en-US" b="1" dirty="0"/>
-              <a:t>1. </a:t>
+              <a:t> </a:t>
             </a:r>
             <a:r>
               <a:rPr lang="en-US" dirty="0"/>
-              <a:t>Create Family</a:t>
-            </a:r>
-            <a:r>
-              <a:rPr lang="en-US" dirty="0" smtClean="0"/>
-              <a:t>:</a:t>
-            </a:r>
-            <a:endParaRPr lang="en-US" dirty="0"/>
-          </a:p>
-        </p:txBody>
-      </p:sp>
-      <p:pic>
-        <p:nvPicPr>
-          <p:cNvPr id="6" name="Picture 5"/>
-          <p:cNvPicPr>
-            <a:picLocks noChangeAspect="1"/>
-          </p:cNvPicPr>
-          <p:nvPr/>
-        </p:nvPicPr>
-        <p:blipFill>
-          <a:blip r:embed="rId2">
-            <a:extLst>
-              <a:ext uri="{28A0092B-C50C-407E-A947-70E740481C1C}">
-                <a14:useLocalDpi xmlns:a14="http://schemas.microsoft.com/office/drawing/2010/main" val="0"/>
-              </a:ext>
-            </a:extLst>
-          </a:blip>
-          <a:stretch>
-            <a:fillRect/>
-          </a:stretch>
-        </p:blipFill>
-        <p:spPr>
-          <a:xfrm>
-            <a:off x="0" y="0"/>
-            <a:ext cx="12192000" cy="6858000"/>
-          </a:xfrm>
-          <a:prstGeom prst="rect">
-            <a:avLst/>
-          </a:prstGeom>
-        </p:spPr>
-      </p:pic>
-    </p:spTree>
-    <p:extLst>
-      <p:ext uri="{BB962C8B-B14F-4D97-AF65-F5344CB8AC3E}">
-        <p14:creationId xmlns:p14="http://schemas.microsoft.com/office/powerpoint/2010/main" val="1165800460"/>
-      </p:ext>
-    </p:extLst>
-  </p:cSld>
-  <p:clrMapOvr>
-    <a:masterClrMapping/>
-  </p:clrMapOvr>
-  <p:timing>
-    <p:tnLst>
-      <p:par>
-        <p:cTn id="1" dur="indefinite" restart="never" nodeType="tmRoot"/>
-      </p:par>
-    </p:tnLst>
-  </p:timing>
-</p:sld>
-</file>
-
-<file path=ppt/slides/slide47.xml><?xml version="1.0" encoding="utf-8"?>
-<p:sld xmlns:a="http://schemas.openxmlformats.org/drawingml/2006/main" xmlns:r="http://schemas.openxmlformats.org/officeDocument/2006/relationships" xmlns:p="http://schemas.openxmlformats.org/presentationml/2006/main">
-  <p:cSld>
-    <p:spTree>
-      <p:nvGrpSpPr>
-        <p:cNvPr id="1" name=""/>
-        <p:cNvGrpSpPr/>
-        <p:nvPr/>
-      </p:nvGrpSpPr>
-      <p:grpSpPr>
-        <a:xfrm>
-          <a:off x="0" y="0"/>
-          <a:ext cx="0" cy="0"/>
-          <a:chOff x="0" y="0"/>
-          <a:chExt cx="0" cy="0"/>
-        </a:xfrm>
-      </p:grpSpPr>
-      <p:sp>
-        <p:nvSpPr>
-          <p:cNvPr id="2" name="Title 1"/>
-          <p:cNvSpPr>
-            <a:spLocks noGrp="1"/>
-          </p:cNvSpPr>
-          <p:nvPr>
-            <p:ph type="title"/>
-          </p:nvPr>
-        </p:nvSpPr>
-        <p:spPr/>
-        <p:txBody>
-          <a:bodyPr/>
-          <a:lstStyle/>
-          <a:p>
-            <a:r>
-              <a:rPr lang="en-US" dirty="0" smtClean="0"/>
-              <a:t>EXERCISE 1</a:t>
-            </a:r>
-            <a:endParaRPr lang="en-US" dirty="0"/>
-          </a:p>
-        </p:txBody>
-      </p:sp>
-      <p:sp>
-        <p:nvSpPr>
-          <p:cNvPr id="3" name="Content Placeholder 2"/>
-          <p:cNvSpPr>
-            <a:spLocks noGrp="1"/>
-          </p:cNvSpPr>
-          <p:nvPr>
-            <p:ph sz="quarter" idx="13"/>
-          </p:nvPr>
-        </p:nvSpPr>
-        <p:spPr/>
-        <p:txBody>
-          <a:bodyPr/>
-          <a:lstStyle/>
-          <a:p>
-            <a:r>
-              <a:rPr lang="en-US" b="1" dirty="0"/>
-              <a:t>1. </a:t>
-            </a:r>
-            <a:r>
-              <a:rPr lang="en-US" dirty="0"/>
-              <a:t>Create Family:</a:t>
+              <a:t>Add Leif:</a:t>
             </a:r>
             <a:br>
               <a:rPr lang="en-US" dirty="0"/>
             </a:br>
             <a:r>
-              <a:rPr lang="en-US" b="1" dirty="0" smtClean="0"/>
-              <a:t>2</a:t>
-            </a:r>
-            <a:r>
-              <a:rPr lang="en-US" b="1" dirty="0"/>
-              <a:t>. </a:t>
-            </a:r>
-            <a:r>
               <a:rPr lang="en-US" dirty="0"/>
-              <a:t>Find Elis grandparents</a:t>
+              <a:t>-Age 73</a:t>
             </a:r>
             <a:br>
               <a:rPr lang="en-US" dirty="0"/>
             </a:br>
             <a:r>
-              <a:rPr lang="en-US" b="1" dirty="0"/>
-              <a:t>3. </a:t>
+              <a:rPr lang="en-US" dirty="0"/>
+              <a:t>-Father of </a:t>
+            </a:r>
+            <a:r>
+              <a:rPr lang="en-US" dirty="0" err="1"/>
+              <a:t>johannes</a:t>
             </a:r>
             <a:r>
               <a:rPr lang="en-US" dirty="0"/>
-              <a:t>List all </a:t>
+              <a:t>, </a:t>
             </a:r>
             <a:r>
-              <a:rPr lang="en-US" dirty="0" smtClean="0"/>
-              <a:t>pets and their owners</a:t>
+              <a:rPr lang="en-US" dirty="0" err="1"/>
+              <a:t>klara</a:t>
+            </a:r>
+            <a:r>
+              <a:rPr lang="en-US" dirty="0"/>
+              <a:t>, </a:t>
+            </a:r>
+            <a:r>
+              <a:rPr lang="en-US" dirty="0" err="1"/>
+              <a:t>christel</a:t>
+            </a:r>
+            <a:r>
+              <a:rPr lang="en-US" dirty="0"/>
+              <a:t>, </a:t>
+            </a:r>
+            <a:r>
+              <a:rPr lang="en-US" dirty="0" err="1"/>
+              <a:t>ZandrA</a:t>
+            </a:r>
+            <a:endParaRPr lang="en-US" dirty="0"/>
+          </a:p>
+          <a:p>
+            <a:pPr lvl="1"/>
+            <a:r>
+              <a:rPr lang="en-US" dirty="0"/>
+              <a:t>  Add Pets (pets should have name, label, and a relationship to owner)</a:t>
+            </a:r>
+            <a:br>
+              <a:rPr lang="en-US" dirty="0"/>
+            </a:br>
+            <a:r>
+              <a:rPr lang="en-US" dirty="0"/>
+              <a:t>	-Jim, Dog, owner Christel</a:t>
+            </a:r>
+            <a:br>
+              <a:rPr lang="en-US" dirty="0"/>
+            </a:br>
+            <a:r>
+              <a:rPr lang="en-US" dirty="0"/>
+              <a:t>	-Fred, Dog, Owner </a:t>
+            </a:r>
+            <a:r>
+              <a:rPr lang="en-US" dirty="0" err="1"/>
+              <a:t>ChristeL</a:t>
             </a:r>
             <a:r>
               <a:rPr lang="en-US" dirty="0"/>
@@ -50709,17 +50597,56 @@
               <a:rPr lang="en-US" dirty="0"/>
             </a:br>
             <a:r>
-              <a:rPr lang="en-US" b="1" dirty="0"/>
-              <a:t>4. </a:t>
+              <a:rPr lang="en-US" dirty="0"/>
+              <a:t>	-Revolver, Cat, Owner </a:t>
+            </a:r>
+            <a:r>
+              <a:rPr lang="en-US" dirty="0" err="1"/>
+              <a:t>Zandra</a:t>
             </a:r>
             <a:r>
               <a:rPr lang="en-US" dirty="0"/>
-              <a:t>list all members from </a:t>
+              <a:t/>
+            </a:r>
+            <a:br>
+              <a:rPr lang="en-US" dirty="0"/>
+            </a:br>
+            <a:r>
+              <a:rPr lang="en-US" dirty="0"/>
+              <a:t>	-Cat2, Cat, Owner </a:t>
             </a:r>
             <a:r>
-              <a:rPr lang="en-US" dirty="0" smtClean="0"/>
-              <a:t>Oldest to Youngest</a:t>
+              <a:rPr lang="en-US" dirty="0" err="1"/>
+              <a:t>Zandra</a:t>
             </a:r>
+            <a:endParaRPr lang="en-US" dirty="0"/>
+          </a:p>
+          <a:p>
+            <a:pPr lvl="1"/>
+            <a:r>
+              <a:rPr lang="en-US" dirty="0"/>
+              <a:t>Find Elis grandparents</a:t>
+            </a:r>
+          </a:p>
+          <a:p>
+            <a:pPr lvl="1"/>
+            <a:r>
+              <a:rPr lang="en-US" dirty="0"/>
+              <a:t>List all pets and their owners</a:t>
+            </a:r>
+          </a:p>
+          <a:p>
+            <a:pPr lvl="1"/>
+            <a:r>
+              <a:rPr lang="en-US" dirty="0"/>
+              <a:t>list all members from Oldest to Youngest</a:t>
+            </a:r>
+          </a:p>
+          <a:p>
+            <a:pPr marL="457200" indent="-457200">
+              <a:buFont typeface="+mj-lt"/>
+              <a:buAutoNum type="arabicPeriod"/>
+            </a:pPr>
             <a:endParaRPr lang="en-US" dirty="0"/>
           </a:p>
         </p:txBody>
@@ -50737,14 +50664,345 @@
   <p:timing>
     <p:tnLst>
       <p:par>
-        <p:cTn id="1" dur="indefinite" restart="never" nodeType="tmRoot"/>
+        <p:cTn id="1" dur="indefinite" restart="never" nodeType="tmRoot">
+          <p:childTnLst>
+            <p:seq concurrent="1" nextAc="seek">
+              <p:cTn id="2" dur="indefinite" nodeType="mainSeq">
+                <p:childTnLst>
+                  <p:par>
+                    <p:cTn id="3" fill="hold">
+                      <p:stCondLst>
+                        <p:cond delay="indefinite"/>
+                      </p:stCondLst>
+                      <p:childTnLst>
+                        <p:par>
+                          <p:cTn id="4" fill="hold">
+                            <p:stCondLst>
+                              <p:cond delay="0"/>
+                            </p:stCondLst>
+                            <p:childTnLst>
+                              <p:par>
+                                <p:cTn id="5" presetID="9" presetClass="entr" presetSubtype="0" fill="hold" grpId="0" nodeType="clickEffect">
+                                  <p:stCondLst>
+                                    <p:cond delay="0"/>
+                                  </p:stCondLst>
+                                  <p:childTnLst>
+                                    <p:set>
+                                      <p:cBhvr>
+                                        <p:cTn id="6" dur="1" fill="hold">
+                                          <p:stCondLst>
+                                            <p:cond delay="0"/>
+                                          </p:stCondLst>
+                                        </p:cTn>
+                                        <p:tgtEl>
+                                          <p:spTgt spid="3">
+                                            <p:txEl>
+                                              <p:pRg st="0" end="0"/>
+                                            </p:txEl>
+                                          </p:spTgt>
+                                        </p:tgtEl>
+                                        <p:attrNameLst>
+                                          <p:attrName>style.visibility</p:attrName>
+                                        </p:attrNameLst>
+                                      </p:cBhvr>
+                                      <p:to>
+                                        <p:strVal val="visible"/>
+                                      </p:to>
+                                    </p:set>
+                                    <p:animEffect transition="in" filter="dissolve">
+                                      <p:cBhvr>
+                                        <p:cTn id="7" dur="500"/>
+                                        <p:tgtEl>
+                                          <p:spTgt spid="3">
+                                            <p:txEl>
+                                              <p:pRg st="0" end="0"/>
+                                            </p:txEl>
+                                          </p:spTgt>
+                                        </p:tgtEl>
+                                      </p:cBhvr>
+                                    </p:animEffect>
+                                  </p:childTnLst>
+                                </p:cTn>
+                              </p:par>
+                            </p:childTnLst>
+                          </p:cTn>
+                        </p:par>
+                      </p:childTnLst>
+                    </p:cTn>
+                  </p:par>
+                  <p:par>
+                    <p:cTn id="8" fill="hold">
+                      <p:stCondLst>
+                        <p:cond delay="indefinite"/>
+                      </p:stCondLst>
+                      <p:childTnLst>
+                        <p:par>
+                          <p:cTn id="9" fill="hold">
+                            <p:stCondLst>
+                              <p:cond delay="0"/>
+                            </p:stCondLst>
+                            <p:childTnLst>
+                              <p:par>
+                                <p:cTn id="10" presetID="9" presetClass="entr" presetSubtype="0" fill="hold" grpId="0" nodeType="clickEffect">
+                                  <p:stCondLst>
+                                    <p:cond delay="0"/>
+                                  </p:stCondLst>
+                                  <p:childTnLst>
+                                    <p:set>
+                                      <p:cBhvr>
+                                        <p:cTn id="11" dur="1" fill="hold">
+                                          <p:stCondLst>
+                                            <p:cond delay="0"/>
+                                          </p:stCondLst>
+                                        </p:cTn>
+                                        <p:tgtEl>
+                                          <p:spTgt spid="3">
+                                            <p:txEl>
+                                              <p:pRg st="1" end="1"/>
+                                            </p:txEl>
+                                          </p:spTgt>
+                                        </p:tgtEl>
+                                        <p:attrNameLst>
+                                          <p:attrName>style.visibility</p:attrName>
+                                        </p:attrNameLst>
+                                      </p:cBhvr>
+                                      <p:to>
+                                        <p:strVal val="visible"/>
+                                      </p:to>
+                                    </p:set>
+                                    <p:animEffect transition="in" filter="dissolve">
+                                      <p:cBhvr>
+                                        <p:cTn id="12" dur="500"/>
+                                        <p:tgtEl>
+                                          <p:spTgt spid="3">
+                                            <p:txEl>
+                                              <p:pRg st="1" end="1"/>
+                                            </p:txEl>
+                                          </p:spTgt>
+                                        </p:tgtEl>
+                                      </p:cBhvr>
+                                    </p:animEffect>
+                                  </p:childTnLst>
+                                </p:cTn>
+                              </p:par>
+                            </p:childTnLst>
+                          </p:cTn>
+                        </p:par>
+                      </p:childTnLst>
+                    </p:cTn>
+                  </p:par>
+                  <p:par>
+                    <p:cTn id="13" fill="hold">
+                      <p:stCondLst>
+                        <p:cond delay="indefinite"/>
+                      </p:stCondLst>
+                      <p:childTnLst>
+                        <p:par>
+                          <p:cTn id="14" fill="hold">
+                            <p:stCondLst>
+                              <p:cond delay="0"/>
+                            </p:stCondLst>
+                            <p:childTnLst>
+                              <p:par>
+                                <p:cTn id="15" presetID="9" presetClass="entr" presetSubtype="0" fill="hold" grpId="0" nodeType="clickEffect">
+                                  <p:stCondLst>
+                                    <p:cond delay="0"/>
+                                  </p:stCondLst>
+                                  <p:childTnLst>
+                                    <p:set>
+                                      <p:cBhvr>
+                                        <p:cTn id="16" dur="1" fill="hold">
+                                          <p:stCondLst>
+                                            <p:cond delay="0"/>
+                                          </p:stCondLst>
+                                        </p:cTn>
+                                        <p:tgtEl>
+                                          <p:spTgt spid="3">
+                                            <p:txEl>
+                                              <p:pRg st="2" end="2"/>
+                                            </p:txEl>
+                                          </p:spTgt>
+                                        </p:tgtEl>
+                                        <p:attrNameLst>
+                                          <p:attrName>style.visibility</p:attrName>
+                                        </p:attrNameLst>
+                                      </p:cBhvr>
+                                      <p:to>
+                                        <p:strVal val="visible"/>
+                                      </p:to>
+                                    </p:set>
+                                    <p:animEffect transition="in" filter="dissolve">
+                                      <p:cBhvr>
+                                        <p:cTn id="17" dur="500"/>
+                                        <p:tgtEl>
+                                          <p:spTgt spid="3">
+                                            <p:txEl>
+                                              <p:pRg st="2" end="2"/>
+                                            </p:txEl>
+                                          </p:spTgt>
+                                        </p:tgtEl>
+                                      </p:cBhvr>
+                                    </p:animEffect>
+                                  </p:childTnLst>
+                                </p:cTn>
+                              </p:par>
+                            </p:childTnLst>
+                          </p:cTn>
+                        </p:par>
+                      </p:childTnLst>
+                    </p:cTn>
+                  </p:par>
+                  <p:par>
+                    <p:cTn id="18" fill="hold">
+                      <p:stCondLst>
+                        <p:cond delay="indefinite"/>
+                      </p:stCondLst>
+                      <p:childTnLst>
+                        <p:par>
+                          <p:cTn id="19" fill="hold">
+                            <p:stCondLst>
+                              <p:cond delay="0"/>
+                            </p:stCondLst>
+                            <p:childTnLst>
+                              <p:par>
+                                <p:cTn id="20" presetID="9" presetClass="entr" presetSubtype="0" fill="hold" grpId="0" nodeType="clickEffect">
+                                  <p:stCondLst>
+                                    <p:cond delay="0"/>
+                                  </p:stCondLst>
+                                  <p:childTnLst>
+                                    <p:set>
+                                      <p:cBhvr>
+                                        <p:cTn id="21" dur="1" fill="hold">
+                                          <p:stCondLst>
+                                            <p:cond delay="0"/>
+                                          </p:stCondLst>
+                                        </p:cTn>
+                                        <p:tgtEl>
+                                          <p:spTgt spid="3">
+                                            <p:txEl>
+                                              <p:pRg st="3" end="3"/>
+                                            </p:txEl>
+                                          </p:spTgt>
+                                        </p:tgtEl>
+                                        <p:attrNameLst>
+                                          <p:attrName>style.visibility</p:attrName>
+                                        </p:attrNameLst>
+                                      </p:cBhvr>
+                                      <p:to>
+                                        <p:strVal val="visible"/>
+                                      </p:to>
+                                    </p:set>
+                                    <p:animEffect transition="in" filter="dissolve">
+                                      <p:cBhvr>
+                                        <p:cTn id="22" dur="500"/>
+                                        <p:tgtEl>
+                                          <p:spTgt spid="3">
+                                            <p:txEl>
+                                              <p:pRg st="3" end="3"/>
+                                            </p:txEl>
+                                          </p:spTgt>
+                                        </p:tgtEl>
+                                      </p:cBhvr>
+                                    </p:animEffect>
+                                  </p:childTnLst>
+                                </p:cTn>
+                              </p:par>
+                            </p:childTnLst>
+                          </p:cTn>
+                        </p:par>
+                      </p:childTnLst>
+                    </p:cTn>
+                  </p:par>
+                  <p:par>
+                    <p:cTn id="23" fill="hold">
+                      <p:stCondLst>
+                        <p:cond delay="indefinite"/>
+                      </p:stCondLst>
+                      <p:childTnLst>
+                        <p:par>
+                          <p:cTn id="24" fill="hold">
+                            <p:stCondLst>
+                              <p:cond delay="0"/>
+                            </p:stCondLst>
+                            <p:childTnLst>
+                              <p:par>
+                                <p:cTn id="25" presetID="9" presetClass="entr" presetSubtype="0" fill="hold" grpId="0" nodeType="clickEffect">
+                                  <p:stCondLst>
+                                    <p:cond delay="0"/>
+                                  </p:stCondLst>
+                                  <p:childTnLst>
+                                    <p:set>
+                                      <p:cBhvr>
+                                        <p:cTn id="26" dur="1" fill="hold">
+                                          <p:stCondLst>
+                                            <p:cond delay="0"/>
+                                          </p:stCondLst>
+                                        </p:cTn>
+                                        <p:tgtEl>
+                                          <p:spTgt spid="3">
+                                            <p:txEl>
+                                              <p:pRg st="4" end="4"/>
+                                            </p:txEl>
+                                          </p:spTgt>
+                                        </p:tgtEl>
+                                        <p:attrNameLst>
+                                          <p:attrName>style.visibility</p:attrName>
+                                        </p:attrNameLst>
+                                      </p:cBhvr>
+                                      <p:to>
+                                        <p:strVal val="visible"/>
+                                      </p:to>
+                                    </p:set>
+                                    <p:animEffect transition="in" filter="dissolve">
+                                      <p:cBhvr>
+                                        <p:cTn id="27" dur="500"/>
+                                        <p:tgtEl>
+                                          <p:spTgt spid="3">
+                                            <p:txEl>
+                                              <p:pRg st="4" end="4"/>
+                                            </p:txEl>
+                                          </p:spTgt>
+                                        </p:tgtEl>
+                                      </p:cBhvr>
+                                    </p:animEffect>
+                                  </p:childTnLst>
+                                </p:cTn>
+                              </p:par>
+                            </p:childTnLst>
+                          </p:cTn>
+                        </p:par>
+                      </p:childTnLst>
+                    </p:cTn>
+                  </p:par>
+                </p:childTnLst>
+              </p:cTn>
+              <p:prevCondLst>
+                <p:cond evt="onPrev" delay="0">
+                  <p:tgtEl>
+                    <p:sldTgt/>
+                  </p:tgtEl>
+                </p:cond>
+              </p:prevCondLst>
+              <p:nextCondLst>
+                <p:cond evt="onNext" delay="0">
+                  <p:tgtEl>
+                    <p:sldTgt/>
+                  </p:tgtEl>
+                </p:cond>
+              </p:nextCondLst>
+            </p:seq>
+          </p:childTnLst>
+        </p:cTn>
       </p:par>
     </p:tnLst>
+    <p:bldLst>
+      <p:bldP spid="3" grpId="0" build="p"/>
+    </p:bldLst>
   </p:timing>
 </p:sld>
 </file>
 
-<file path=ppt/slides/slide48.xml><?xml version="1.0" encoding="utf-8"?>
+<file path=ppt/slides/slide47.xml><?xml version="1.0" encoding="utf-8"?>
 <p:sld xmlns:a="http://schemas.openxmlformats.org/drawingml/2006/main" xmlns:r="http://schemas.openxmlformats.org/officeDocument/2006/relationships" xmlns:p="http://schemas.openxmlformats.org/presentationml/2006/main">
   <p:cSld>
     <p:spTree>
@@ -50799,55 +51057,57 @@
           <a:bodyPr/>
           <a:lstStyle/>
           <a:p>
+            <a:pPr marL="457200" indent="-457200">
+              <a:buFont typeface="+mj-lt"/>
+              <a:buAutoNum type="arabicPeriod"/>
+            </a:pPr>
             <a:r>
-              <a:rPr lang="en-US" b="1" dirty="0"/>
-              <a:t>1. </a:t>
+              <a:rPr lang="en-US" dirty="0" smtClean="0"/>
+              <a:t>Find </a:t>
             </a:r>
             <a:r>
               <a:rPr lang="en-US" dirty="0"/>
-              <a:t>Find all actors, sort them by how many movies they have acted in, return number of movies and actors </a:t>
+              <a:t>all actors, sort them by how many movies they have acted in, return number of movies and actors </a:t>
             </a:r>
             <a:r>
               <a:rPr lang="en-US" dirty="0" smtClean="0"/>
               <a:t>names</a:t>
             </a:r>
+          </a:p>
+          <a:p>
+            <a:pPr marL="457200" indent="-457200">
+              <a:buFont typeface="+mj-lt"/>
+              <a:buAutoNum type="arabicPeriod"/>
+            </a:pPr>
             <a:r>
-              <a:rPr lang="en-US" dirty="0"/>
-              <a:t/>
-            </a:r>
-            <a:br>
-              <a:rPr lang="en-US" dirty="0"/>
-            </a:br>
-            <a:r>
-              <a:rPr lang="en-US" b="1" dirty="0"/>
-              <a:t>2</a:t>
-            </a:r>
-            <a:r>
-              <a:rPr lang="en-US" b="1" dirty="0" smtClean="0"/>
-              <a:t>. </a:t>
+              <a:rPr lang="en-US" dirty="0" smtClean="0"/>
+              <a:t>Find </a:t>
             </a:r>
             <a:r>
               <a:rPr lang="en-US" dirty="0"/>
-              <a:t>Find all directors that have worked with Tom Hanks, </a:t>
+              <a:t>all directors that have worked with Tom Hanks, </a:t>
             </a:r>
             <a:r>
               <a:rPr lang="en-US" dirty="0" smtClean="0"/>
-              <a:t>Sort them by age</a:t>
+              <a:t>Sort them by </a:t>
             </a:r>
             <a:r>
-              <a:rPr lang="en-US" dirty="0"/>
-              <a:t/>
+              <a:rPr lang="en-US" dirty="0" smtClean="0"/>
+              <a:t>age</a:t>
             </a:r>
-            <a:br>
-              <a:rPr lang="en-US" dirty="0"/>
-            </a:br>
+          </a:p>
+          <a:p>
+            <a:pPr marL="457200" indent="-457200">
+              <a:buFont typeface="+mj-lt"/>
+              <a:buAutoNum type="arabicPeriod"/>
+            </a:pPr>
             <a:r>
               <a:rPr lang="en-US" dirty="0" smtClean="0"/>
-              <a:t>3. Find all Actors that have worked together, sort them by number of times they have worked together. Return the actors names and how many </a:t>
+              <a:t>Find </a:t>
             </a:r>
             <a:r>
-              <a:rPr lang="en-US" smtClean="0"/>
-              <a:t>times.</a:t>
+              <a:rPr lang="en-US" dirty="0" smtClean="0"/>
+              <a:t>all Actors that have worked together, sort them by number of times they have worked together. Return the actors names and how many times.</a:t>
             </a:r>
             <a:endParaRPr lang="en-US" dirty="0"/>
           </a:p>
@@ -50866,9 +51126,344 @@
   <p:timing>
     <p:tnLst>
       <p:par>
-        <p:cTn id="1" dur="indefinite" restart="never" nodeType="tmRoot"/>
+        <p:cTn id="1" dur="indefinite" restart="never" nodeType="tmRoot">
+          <p:childTnLst>
+            <p:seq concurrent="1" nextAc="seek">
+              <p:cTn id="2" dur="indefinite" nodeType="mainSeq">
+                <p:childTnLst>
+                  <p:par>
+                    <p:cTn id="3" fill="hold">
+                      <p:stCondLst>
+                        <p:cond delay="indefinite"/>
+                      </p:stCondLst>
+                      <p:childTnLst>
+                        <p:par>
+                          <p:cTn id="4" fill="hold">
+                            <p:stCondLst>
+                              <p:cond delay="0"/>
+                            </p:stCondLst>
+                            <p:childTnLst>
+                              <p:par>
+                                <p:cTn id="5" presetID="2" presetClass="entr" presetSubtype="4" fill="hold" grpId="0" nodeType="clickEffect">
+                                  <p:stCondLst>
+                                    <p:cond delay="0"/>
+                                  </p:stCondLst>
+                                  <p:childTnLst>
+                                    <p:set>
+                                      <p:cBhvr>
+                                        <p:cTn id="6" dur="1" fill="hold">
+                                          <p:stCondLst>
+                                            <p:cond delay="0"/>
+                                          </p:stCondLst>
+                                        </p:cTn>
+                                        <p:tgtEl>
+                                          <p:spTgt spid="3">
+                                            <p:txEl>
+                                              <p:pRg st="0" end="0"/>
+                                            </p:txEl>
+                                          </p:spTgt>
+                                        </p:tgtEl>
+                                        <p:attrNameLst>
+                                          <p:attrName>style.visibility</p:attrName>
+                                        </p:attrNameLst>
+                                      </p:cBhvr>
+                                      <p:to>
+                                        <p:strVal val="visible"/>
+                                      </p:to>
+                                    </p:set>
+                                    <p:anim calcmode="lin" valueType="num">
+                                      <p:cBhvr additive="base">
+                                        <p:cTn id="7" dur="500" fill="hold"/>
+                                        <p:tgtEl>
+                                          <p:spTgt spid="3">
+                                            <p:txEl>
+                                              <p:pRg st="0" end="0"/>
+                                            </p:txEl>
+                                          </p:spTgt>
+                                        </p:tgtEl>
+                                        <p:attrNameLst>
+                                          <p:attrName>ppt_x</p:attrName>
+                                        </p:attrNameLst>
+                                      </p:cBhvr>
+                                      <p:tavLst>
+                                        <p:tav tm="0">
+                                          <p:val>
+                                            <p:strVal val="#ppt_x"/>
+                                          </p:val>
+                                        </p:tav>
+                                        <p:tav tm="100000">
+                                          <p:val>
+                                            <p:strVal val="#ppt_x"/>
+                                          </p:val>
+                                        </p:tav>
+                                      </p:tavLst>
+                                    </p:anim>
+                                    <p:anim calcmode="lin" valueType="num">
+                                      <p:cBhvr additive="base">
+                                        <p:cTn id="8" dur="500" fill="hold"/>
+                                        <p:tgtEl>
+                                          <p:spTgt spid="3">
+                                            <p:txEl>
+                                              <p:pRg st="0" end="0"/>
+                                            </p:txEl>
+                                          </p:spTgt>
+                                        </p:tgtEl>
+                                        <p:attrNameLst>
+                                          <p:attrName>ppt_y</p:attrName>
+                                        </p:attrNameLst>
+                                      </p:cBhvr>
+                                      <p:tavLst>
+                                        <p:tav tm="0">
+                                          <p:val>
+                                            <p:strVal val="1+#ppt_h/2"/>
+                                          </p:val>
+                                        </p:tav>
+                                        <p:tav tm="100000">
+                                          <p:val>
+                                            <p:strVal val="#ppt_y"/>
+                                          </p:val>
+                                        </p:tav>
+                                      </p:tavLst>
+                                    </p:anim>
+                                  </p:childTnLst>
+                                </p:cTn>
+                              </p:par>
+                            </p:childTnLst>
+                          </p:cTn>
+                        </p:par>
+                      </p:childTnLst>
+                    </p:cTn>
+                  </p:par>
+                  <p:par>
+                    <p:cTn id="9" fill="hold">
+                      <p:stCondLst>
+                        <p:cond delay="indefinite"/>
+                      </p:stCondLst>
+                      <p:childTnLst>
+                        <p:par>
+                          <p:cTn id="10" fill="hold">
+                            <p:stCondLst>
+                              <p:cond delay="0"/>
+                            </p:stCondLst>
+                            <p:childTnLst>
+                              <p:par>
+                                <p:cTn id="11" presetID="2" presetClass="entr" presetSubtype="4" fill="hold" grpId="0" nodeType="clickEffect">
+                                  <p:stCondLst>
+                                    <p:cond delay="0"/>
+                                  </p:stCondLst>
+                                  <p:childTnLst>
+                                    <p:set>
+                                      <p:cBhvr>
+                                        <p:cTn id="12" dur="1" fill="hold">
+                                          <p:stCondLst>
+                                            <p:cond delay="0"/>
+                                          </p:stCondLst>
+                                        </p:cTn>
+                                        <p:tgtEl>
+                                          <p:spTgt spid="3">
+                                            <p:txEl>
+                                              <p:pRg st="1" end="1"/>
+                                            </p:txEl>
+                                          </p:spTgt>
+                                        </p:tgtEl>
+                                        <p:attrNameLst>
+                                          <p:attrName>style.visibility</p:attrName>
+                                        </p:attrNameLst>
+                                      </p:cBhvr>
+                                      <p:to>
+                                        <p:strVal val="visible"/>
+                                      </p:to>
+                                    </p:set>
+                                    <p:anim calcmode="lin" valueType="num">
+                                      <p:cBhvr additive="base">
+                                        <p:cTn id="13" dur="500" fill="hold"/>
+                                        <p:tgtEl>
+                                          <p:spTgt spid="3">
+                                            <p:txEl>
+                                              <p:pRg st="1" end="1"/>
+                                            </p:txEl>
+                                          </p:spTgt>
+                                        </p:tgtEl>
+                                        <p:attrNameLst>
+                                          <p:attrName>ppt_x</p:attrName>
+                                        </p:attrNameLst>
+                                      </p:cBhvr>
+                                      <p:tavLst>
+                                        <p:tav tm="0">
+                                          <p:val>
+                                            <p:strVal val="#ppt_x"/>
+                                          </p:val>
+                                        </p:tav>
+                                        <p:tav tm="100000">
+                                          <p:val>
+                                            <p:strVal val="#ppt_x"/>
+                                          </p:val>
+                                        </p:tav>
+                                      </p:tavLst>
+                                    </p:anim>
+                                    <p:anim calcmode="lin" valueType="num">
+                                      <p:cBhvr additive="base">
+                                        <p:cTn id="14" dur="500" fill="hold"/>
+                                        <p:tgtEl>
+                                          <p:spTgt spid="3">
+                                            <p:txEl>
+                                              <p:pRg st="1" end="1"/>
+                                            </p:txEl>
+                                          </p:spTgt>
+                                        </p:tgtEl>
+                                        <p:attrNameLst>
+                                          <p:attrName>ppt_y</p:attrName>
+                                        </p:attrNameLst>
+                                      </p:cBhvr>
+                                      <p:tavLst>
+                                        <p:tav tm="0">
+                                          <p:val>
+                                            <p:strVal val="1+#ppt_h/2"/>
+                                          </p:val>
+                                        </p:tav>
+                                        <p:tav tm="100000">
+                                          <p:val>
+                                            <p:strVal val="#ppt_y"/>
+                                          </p:val>
+                                        </p:tav>
+                                      </p:tavLst>
+                                    </p:anim>
+                                  </p:childTnLst>
+                                </p:cTn>
+                              </p:par>
+                            </p:childTnLst>
+                          </p:cTn>
+                        </p:par>
+                      </p:childTnLst>
+                    </p:cTn>
+                  </p:par>
+                  <p:par>
+                    <p:cTn id="15" fill="hold">
+                      <p:stCondLst>
+                        <p:cond delay="indefinite"/>
+                      </p:stCondLst>
+                      <p:childTnLst>
+                        <p:par>
+                          <p:cTn id="16" fill="hold">
+                            <p:stCondLst>
+                              <p:cond delay="0"/>
+                            </p:stCondLst>
+                            <p:childTnLst>
+                              <p:par>
+                                <p:cTn id="17" presetID="2" presetClass="entr" presetSubtype="4" fill="hold" grpId="0" nodeType="clickEffect">
+                                  <p:stCondLst>
+                                    <p:cond delay="0"/>
+                                  </p:stCondLst>
+                                  <p:childTnLst>
+                                    <p:set>
+                                      <p:cBhvr>
+                                        <p:cTn id="18" dur="1" fill="hold">
+                                          <p:stCondLst>
+                                            <p:cond delay="0"/>
+                                          </p:stCondLst>
+                                        </p:cTn>
+                                        <p:tgtEl>
+                                          <p:spTgt spid="3">
+                                            <p:txEl>
+                                              <p:pRg st="2" end="2"/>
+                                            </p:txEl>
+                                          </p:spTgt>
+                                        </p:tgtEl>
+                                        <p:attrNameLst>
+                                          <p:attrName>style.visibility</p:attrName>
+                                        </p:attrNameLst>
+                                      </p:cBhvr>
+                                      <p:to>
+                                        <p:strVal val="visible"/>
+                                      </p:to>
+                                    </p:set>
+                                    <p:anim calcmode="lin" valueType="num">
+                                      <p:cBhvr additive="base">
+                                        <p:cTn id="19" dur="500" fill="hold"/>
+                                        <p:tgtEl>
+                                          <p:spTgt spid="3">
+                                            <p:txEl>
+                                              <p:pRg st="2" end="2"/>
+                                            </p:txEl>
+                                          </p:spTgt>
+                                        </p:tgtEl>
+                                        <p:attrNameLst>
+                                          <p:attrName>ppt_x</p:attrName>
+                                        </p:attrNameLst>
+                                      </p:cBhvr>
+                                      <p:tavLst>
+                                        <p:tav tm="0">
+                                          <p:val>
+                                            <p:strVal val="#ppt_x"/>
+                                          </p:val>
+                                        </p:tav>
+                                        <p:tav tm="100000">
+                                          <p:val>
+                                            <p:strVal val="#ppt_x"/>
+                                          </p:val>
+                                        </p:tav>
+                                      </p:tavLst>
+                                    </p:anim>
+                                    <p:anim calcmode="lin" valueType="num">
+                                      <p:cBhvr additive="base">
+                                        <p:cTn id="20" dur="500" fill="hold"/>
+                                        <p:tgtEl>
+                                          <p:spTgt spid="3">
+                                            <p:txEl>
+                                              <p:pRg st="2" end="2"/>
+                                            </p:txEl>
+                                          </p:spTgt>
+                                        </p:tgtEl>
+                                        <p:attrNameLst>
+                                          <p:attrName>ppt_y</p:attrName>
+                                        </p:attrNameLst>
+                                      </p:cBhvr>
+                                      <p:tavLst>
+                                        <p:tav tm="0">
+                                          <p:val>
+                                            <p:strVal val="1+#ppt_h/2"/>
+                                          </p:val>
+                                        </p:tav>
+                                        <p:tav tm="100000">
+                                          <p:val>
+                                            <p:strVal val="#ppt_y"/>
+                                          </p:val>
+                                        </p:tav>
+                                      </p:tavLst>
+                                    </p:anim>
+                                  </p:childTnLst>
+                                </p:cTn>
+                              </p:par>
+                            </p:childTnLst>
+                          </p:cTn>
+                        </p:par>
+                      </p:childTnLst>
+                    </p:cTn>
+                  </p:par>
+                </p:childTnLst>
+              </p:cTn>
+              <p:prevCondLst>
+                <p:cond evt="onPrev" delay="0">
+                  <p:tgtEl>
+                    <p:sldTgt/>
+                  </p:tgtEl>
+                </p:cond>
+              </p:prevCondLst>
+              <p:nextCondLst>
+                <p:cond evt="onNext" delay="0">
+                  <p:tgtEl>
+                    <p:sldTgt/>
+                  </p:tgtEl>
+                </p:cond>
+              </p:nextCondLst>
+            </p:seq>
+          </p:childTnLst>
+        </p:cTn>
       </p:par>
     </p:tnLst>
+    <p:bldLst>
+      <p:bldP spid="3" grpId="0" build="p"/>
+    </p:bldLst>
   </p:timing>
 </p:sld>
 </file>

</xml_diff>